<commit_message>
SmartHome figure translated in english!
</commit_message>
<xml_diff>
--- a/fordcs-docs/EDUp FORDCS-V1.0 Project-v2022.04/CUSTOMER REQUIREMENTS/EDUp-FORDCS-V1.0 Customer-Requirements-v2022.05.pptx
+++ b/fordcs-docs/EDUp FORDCS-V1.0 Project-v2022.04/CUSTOMER REQUIREMENTS/EDUp-FORDCS-V1.0 Customer-Requirements-v2022.05.pptx
@@ -5,7 +5,7 @@
     <p:sldMasterId id="2147483825" r:id="rId1"/>
   </p:sldMasterIdLst>
   <p:notesMasterIdLst>
-    <p:notesMasterId r:id="rId18"/>
+    <p:notesMasterId r:id="rId19"/>
   </p:notesMasterIdLst>
   <p:sldIdLst>
     <p:sldId id="256" r:id="rId2"/>
@@ -24,6 +24,7 @@
     <p:sldId id="353" r:id="rId15"/>
     <p:sldId id="260" r:id="rId16"/>
     <p:sldId id="267" r:id="rId17"/>
+    <p:sldId id="367" r:id="rId18"/>
   </p:sldIdLst>
   <p:sldSz cx="12192000" cy="6858000"/>
   <p:notesSz cx="6858000" cy="9144000"/>
@@ -212,7 +213,7 @@
           <a:p>
             <a:fld id="{539DD351-8589-4C54-8C15-6939E203DE67}" type="datetimeFigureOut">
               <a:rPr lang="en-US" smtClean="0"/>
-              <a:t>2/11/2024</a:t>
+              <a:t>2/12/2024</a:t>
             </a:fld>
             <a:endParaRPr lang="en-US"/>
           </a:p>
@@ -1001,7 +1002,7 @@
           <a:p>
             <a:fld id="{F5BA542F-B73B-47E7-BABB-8194D77513EA}" type="datetimeFigureOut">
               <a:rPr lang="en-GB" smtClean="0"/>
-              <a:t>11/02/2024</a:t>
+              <a:t>12/02/2024</a:t>
             </a:fld>
             <a:endParaRPr lang="en-GB" dirty="0"/>
           </a:p>
@@ -1180,7 +1181,7 @@
           <a:p>
             <a:fld id="{F5BA542F-B73B-47E7-BABB-8194D77513EA}" type="datetimeFigureOut">
               <a:rPr lang="en-GB" smtClean="0"/>
-              <a:t>11/02/2024</a:t>
+              <a:t>12/02/2024</a:t>
             </a:fld>
             <a:endParaRPr lang="en-GB" dirty="0"/>
           </a:p>
@@ -1360,7 +1361,7 @@
           <a:p>
             <a:fld id="{F5BA542F-B73B-47E7-BABB-8194D77513EA}" type="datetimeFigureOut">
               <a:rPr lang="en-GB" smtClean="0"/>
-              <a:t>11/02/2024</a:t>
+              <a:t>12/02/2024</a:t>
             </a:fld>
             <a:endParaRPr lang="en-GB" dirty="0"/>
           </a:p>
@@ -1530,7 +1531,7 @@
           <a:p>
             <a:fld id="{F5BA542F-B73B-47E7-BABB-8194D77513EA}" type="datetimeFigureOut">
               <a:rPr lang="en-GB" smtClean="0"/>
-              <a:t>11/02/2024</a:t>
+              <a:t>12/02/2024</a:t>
             </a:fld>
             <a:endParaRPr lang="en-GB" dirty="0"/>
           </a:p>
@@ -1843,7 +1844,7 @@
           <a:p>
             <a:fld id="{F5BA542F-B73B-47E7-BABB-8194D77513EA}" type="datetimeFigureOut">
               <a:rPr lang="en-GB" smtClean="0"/>
-              <a:t>11/02/2024</a:t>
+              <a:t>12/02/2024</a:t>
             </a:fld>
             <a:endParaRPr lang="en-GB" dirty="0"/>
           </a:p>
@@ -2229,7 +2230,7 @@
           <a:p>
             <a:fld id="{F5BA542F-B73B-47E7-BABB-8194D77513EA}" type="datetimeFigureOut">
               <a:rPr lang="en-GB" smtClean="0"/>
-              <a:t>11/02/2024</a:t>
+              <a:t>12/02/2024</a:t>
             </a:fld>
             <a:endParaRPr lang="en-GB" dirty="0"/>
           </a:p>
@@ -2663,7 +2664,7 @@
           <a:p>
             <a:fld id="{F5BA542F-B73B-47E7-BABB-8194D77513EA}" type="datetimeFigureOut">
               <a:rPr lang="en-GB" smtClean="0"/>
-              <a:t>11/02/2024</a:t>
+              <a:t>12/02/2024</a:t>
             </a:fld>
             <a:endParaRPr lang="en-GB" dirty="0"/>
           </a:p>
@@ -2781,7 +2782,7 @@
           <a:p>
             <a:fld id="{F5BA542F-B73B-47E7-BABB-8194D77513EA}" type="datetimeFigureOut">
               <a:rPr lang="en-GB" smtClean="0"/>
-              <a:t>11/02/2024</a:t>
+              <a:t>12/02/2024</a:t>
             </a:fld>
             <a:endParaRPr lang="en-GB" dirty="0"/>
           </a:p>
@@ -2876,7 +2877,7 @@
           <a:p>
             <a:fld id="{F5BA542F-B73B-47E7-BABB-8194D77513EA}" type="datetimeFigureOut">
               <a:rPr lang="en-GB" smtClean="0"/>
-              <a:t>11/02/2024</a:t>
+              <a:t>12/02/2024</a:t>
             </a:fld>
             <a:endParaRPr lang="en-GB" dirty="0"/>
           </a:p>
@@ -3226,7 +3227,7 @@
           <a:p>
             <a:fld id="{F5BA542F-B73B-47E7-BABB-8194D77513EA}" type="datetimeFigureOut">
               <a:rPr lang="en-GB" smtClean="0"/>
-              <a:t>11/02/2024</a:t>
+              <a:t>12/02/2024</a:t>
             </a:fld>
             <a:endParaRPr lang="en-GB" dirty="0"/>
           </a:p>
@@ -3651,7 +3652,7 @@
           <a:p>
             <a:fld id="{F5BA542F-B73B-47E7-BABB-8194D77513EA}" type="datetimeFigureOut">
               <a:rPr lang="en-GB" smtClean="0"/>
-              <a:t>11/02/2024</a:t>
+              <a:t>12/02/2024</a:t>
             </a:fld>
             <a:endParaRPr lang="en-GB" dirty="0"/>
           </a:p>
@@ -3932,7 +3933,7 @@
           <a:p>
             <a:fld id="{F5BA542F-B73B-47E7-BABB-8194D77513EA}" type="datetimeFigureOut">
               <a:rPr lang="en-GB" smtClean="0"/>
-              <a:t>11/02/2024</a:t>
+              <a:t>12/02/2024</a:t>
             </a:fld>
             <a:endParaRPr lang="en-GB" dirty="0"/>
           </a:p>
@@ -14930,6 +14931,805 @@
 </p:sld>
 </file>
 
+<file path=ppt/slides/slide17.xml><?xml version="1.0" encoding="utf-8"?>
+<p:sld xmlns:a="http://schemas.openxmlformats.org/drawingml/2006/main" xmlns:r="http://schemas.openxmlformats.org/officeDocument/2006/relationships" xmlns:p="http://schemas.openxmlformats.org/presentationml/2006/main">
+  <p:cSld>
+    <p:spTree>
+      <p:nvGrpSpPr>
+        <p:cNvPr id="1" name=""/>
+        <p:cNvGrpSpPr/>
+        <p:nvPr/>
+      </p:nvGrpSpPr>
+      <p:grpSpPr>
+        <a:xfrm>
+          <a:off x="0" y="0"/>
+          <a:ext cx="0" cy="0"/>
+          <a:chOff x="0" y="0"/>
+          <a:chExt cx="0" cy="0"/>
+        </a:xfrm>
+      </p:grpSpPr>
+      <p:sp>
+        <p:nvSpPr>
+          <p:cNvPr id="2" name="Title 1">
+            <a:extLst>
+              <a:ext uri="{FF2B5EF4-FFF2-40B4-BE49-F238E27FC236}">
+                <a16:creationId xmlns:a16="http://schemas.microsoft.com/office/drawing/2014/main" id="{16A5B27F-6B44-44F0-A5EC-A585BB3C2652}"/>
+              </a:ext>
+            </a:extLst>
+          </p:cNvPr>
+          <p:cNvSpPr>
+            <a:spLocks noGrp="1"/>
+          </p:cNvSpPr>
+          <p:nvPr>
+            <p:ph type="title"/>
+          </p:nvPr>
+        </p:nvSpPr>
+        <p:spPr>
+          <a:xfrm>
+            <a:off x="1024128" y="0"/>
+            <a:ext cx="9720072" cy="890337"/>
+          </a:xfrm>
+        </p:spPr>
+        <p:txBody>
+          <a:bodyPr/>
+          <a:lstStyle/>
+          <a:p>
+            <a:r>
+              <a:rPr lang="de-AT" dirty="0"/>
+              <a:t>FORDCS</a:t>
+            </a:r>
+            <a:r>
+              <a:rPr lang="tr-TR" dirty="0"/>
+              <a:t> </a:t>
+            </a:r>
+            <a:r>
+              <a:rPr lang="de-AT" dirty="0"/>
+              <a:t>C</a:t>
+            </a:r>
+            <a:r>
+              <a:rPr lang="tr-TR" dirty="0"/>
+              <a:t>ONTEXT – SMART HOME</a:t>
+            </a:r>
+            <a:endParaRPr lang="de-AT" dirty="0"/>
+          </a:p>
+        </p:txBody>
+      </p:sp>
+      <p:sp>
+        <p:nvSpPr>
+          <p:cNvPr id="3" name="Content Placeholder 2">
+            <a:extLst>
+              <a:ext uri="{FF2B5EF4-FFF2-40B4-BE49-F238E27FC236}">
+                <a16:creationId xmlns:a16="http://schemas.microsoft.com/office/drawing/2014/main" id="{3E6BF13F-FA46-4F06-BEFB-5B0CA69F1086}"/>
+              </a:ext>
+            </a:extLst>
+          </p:cNvPr>
+          <p:cNvSpPr>
+            <a:spLocks noGrp="1"/>
+          </p:cNvSpPr>
+          <p:nvPr>
+            <p:ph idx="1"/>
+          </p:nvPr>
+        </p:nvSpPr>
+        <p:spPr/>
+        <p:txBody>
+          <a:bodyPr/>
+          <a:lstStyle/>
+          <a:p>
+            <a:endParaRPr lang="de-AT"/>
+          </a:p>
+        </p:txBody>
+      </p:sp>
+      <p:pic>
+        <p:nvPicPr>
+          <p:cNvPr id="4" name="Picture 3">
+            <a:extLst>
+              <a:ext uri="{FF2B5EF4-FFF2-40B4-BE49-F238E27FC236}">
+                <a16:creationId xmlns:a16="http://schemas.microsoft.com/office/drawing/2014/main" id="{7680AEE7-12BC-483B-9DB1-5B494A08A5A2}"/>
+              </a:ext>
+            </a:extLst>
+          </p:cNvPr>
+          <p:cNvPicPr>
+            <a:picLocks noChangeAspect="1"/>
+          </p:cNvPicPr>
+          <p:nvPr/>
+        </p:nvPicPr>
+        <p:blipFill>
+          <a:blip r:embed="rId2"/>
+          <a:stretch>
+            <a:fillRect/>
+          </a:stretch>
+        </p:blipFill>
+        <p:spPr>
+          <a:xfrm>
+            <a:off x="6328611" y="1479884"/>
+            <a:ext cx="5860518" cy="4451684"/>
+          </a:xfrm>
+          <a:prstGeom prst="rect">
+            <a:avLst/>
+          </a:prstGeom>
+        </p:spPr>
+      </p:pic>
+      <p:grpSp>
+        <p:nvGrpSpPr>
+          <p:cNvPr id="25" name="Group 24">
+            <a:extLst>
+              <a:ext uri="{FF2B5EF4-FFF2-40B4-BE49-F238E27FC236}">
+                <a16:creationId xmlns:a16="http://schemas.microsoft.com/office/drawing/2014/main" id="{062445CD-4BCC-0326-B51D-C29D942E92A7}"/>
+              </a:ext>
+            </a:extLst>
+          </p:cNvPr>
+          <p:cNvGrpSpPr/>
+          <p:nvPr/>
+        </p:nvGrpSpPr>
+        <p:grpSpPr>
+          <a:xfrm>
+            <a:off x="-274726" y="890337"/>
+            <a:ext cx="6603337" cy="5961326"/>
+            <a:chOff x="-274726" y="890337"/>
+            <a:chExt cx="6603337" cy="5961326"/>
+          </a:xfrm>
+        </p:grpSpPr>
+        <p:pic>
+          <p:nvPicPr>
+            <p:cNvPr id="6" name="Picture 5">
+              <a:extLst>
+                <a:ext uri="{FF2B5EF4-FFF2-40B4-BE49-F238E27FC236}">
+                  <a16:creationId xmlns:a16="http://schemas.microsoft.com/office/drawing/2014/main" id="{31156CC1-9551-475E-98BA-17485BDC4B68}"/>
+                </a:ext>
+              </a:extLst>
+            </p:cNvPr>
+            <p:cNvPicPr>
+              <a:picLocks noChangeAspect="1"/>
+            </p:cNvPicPr>
+            <p:nvPr/>
+          </p:nvPicPr>
+          <p:blipFill>
+            <a:blip r:embed="rId3"/>
+            <a:stretch>
+              <a:fillRect/>
+            </a:stretch>
+          </p:blipFill>
+          <p:spPr>
+            <a:xfrm>
+              <a:off x="0" y="890337"/>
+              <a:ext cx="6328611" cy="5961326"/>
+            </a:xfrm>
+            <a:prstGeom prst="rect">
+              <a:avLst/>
+            </a:prstGeom>
+          </p:spPr>
+        </p:pic>
+        <p:sp>
+          <p:nvSpPr>
+            <p:cNvPr id="11" name="TextBox 10">
+              <a:extLst>
+                <a:ext uri="{FF2B5EF4-FFF2-40B4-BE49-F238E27FC236}">
+                  <a16:creationId xmlns:a16="http://schemas.microsoft.com/office/drawing/2014/main" id="{302743EA-C799-8ACC-8D1A-5A1650D68FE5}"/>
+                </a:ext>
+              </a:extLst>
+            </p:cNvPr>
+            <p:cNvSpPr txBox="1"/>
+            <p:nvPr/>
+          </p:nvSpPr>
+          <p:spPr>
+            <a:xfrm>
+              <a:off x="0" y="940299"/>
+              <a:ext cx="2922814" cy="261610"/>
+            </a:xfrm>
+            <a:prstGeom prst="rect">
+              <a:avLst/>
+            </a:prstGeom>
+            <a:solidFill>
+              <a:srgbClr val="D8E6F3"/>
+            </a:solidFill>
+          </p:spPr>
+          <p:txBody>
+            <a:bodyPr wrap="square">
+              <a:spAutoFit/>
+            </a:bodyPr>
+            <a:lstStyle/>
+            <a:p>
+              <a:r>
+                <a:rPr lang="en-US" sz="1100" b="1" dirty="0"/>
+                <a:t>Energy Management System (EMS)</a:t>
+              </a:r>
+            </a:p>
+          </p:txBody>
+        </p:sp>
+        <p:sp>
+          <p:nvSpPr>
+            <p:cNvPr id="13" name="TextBox 12">
+              <a:extLst>
+                <a:ext uri="{FF2B5EF4-FFF2-40B4-BE49-F238E27FC236}">
+                  <a16:creationId xmlns:a16="http://schemas.microsoft.com/office/drawing/2014/main" id="{BE684193-2C2C-9B2F-0C0A-53DFE8BE25FB}"/>
+                </a:ext>
+              </a:extLst>
+            </p:cNvPr>
+            <p:cNvSpPr txBox="1"/>
+            <p:nvPr/>
+          </p:nvSpPr>
+          <p:spPr>
+            <a:xfrm>
+              <a:off x="1943100" y="1170216"/>
+              <a:ext cx="1676123" cy="215444"/>
+            </a:xfrm>
+            <a:prstGeom prst="rect">
+              <a:avLst/>
+            </a:prstGeom>
+            <a:solidFill>
+              <a:srgbClr val="DBE7F3"/>
+            </a:solidFill>
+            <a:ln>
+              <a:solidFill>
+                <a:srgbClr val="D7E5F1"/>
+              </a:solidFill>
+            </a:ln>
+          </p:spPr>
+          <p:txBody>
+            <a:bodyPr wrap="square">
+              <a:spAutoFit/>
+            </a:bodyPr>
+            <a:lstStyle/>
+            <a:p>
+              <a:r>
+                <a:rPr lang="en-US" sz="800" dirty="0"/>
+                <a:t>low-voltage network</a:t>
+              </a:r>
+            </a:p>
+          </p:txBody>
+        </p:sp>
+        <p:sp>
+          <p:nvSpPr>
+            <p:cNvPr id="14" name="TextBox 13">
+              <a:extLst>
+                <a:ext uri="{FF2B5EF4-FFF2-40B4-BE49-F238E27FC236}">
+                  <a16:creationId xmlns:a16="http://schemas.microsoft.com/office/drawing/2014/main" id="{A02A609E-E0E8-45A1-AF6F-03397A50AFFE}"/>
+                </a:ext>
+              </a:extLst>
+            </p:cNvPr>
+            <p:cNvSpPr txBox="1"/>
+            <p:nvPr/>
+          </p:nvSpPr>
+          <p:spPr>
+            <a:xfrm>
+              <a:off x="5004706" y="1133704"/>
+              <a:ext cx="1257023" cy="200055"/>
+            </a:xfrm>
+            <a:prstGeom prst="rect">
+              <a:avLst/>
+            </a:prstGeom>
+            <a:solidFill>
+              <a:srgbClr val="DBE7F3"/>
+            </a:solidFill>
+            <a:ln>
+              <a:solidFill>
+                <a:srgbClr val="D7E5F1"/>
+              </a:solidFill>
+            </a:ln>
+          </p:spPr>
+          <p:txBody>
+            <a:bodyPr wrap="square">
+              <a:spAutoFit/>
+            </a:bodyPr>
+            <a:lstStyle/>
+            <a:p>
+              <a:r>
+                <a:rPr lang="en-US" sz="700" dirty="0"/>
+                <a:t>medium-voltage network</a:t>
+              </a:r>
+            </a:p>
+          </p:txBody>
+        </p:sp>
+        <p:sp>
+          <p:nvSpPr>
+            <p:cNvPr id="16" name="TextBox 15">
+              <a:extLst>
+                <a:ext uri="{FF2B5EF4-FFF2-40B4-BE49-F238E27FC236}">
+                  <a16:creationId xmlns:a16="http://schemas.microsoft.com/office/drawing/2014/main" id="{AB882381-ACBA-E220-F294-516AEF70A7B8}"/>
+                </a:ext>
+              </a:extLst>
+            </p:cNvPr>
+            <p:cNvSpPr txBox="1"/>
+            <p:nvPr/>
+          </p:nvSpPr>
+          <p:spPr>
+            <a:xfrm>
+              <a:off x="654909" y="5863817"/>
+              <a:ext cx="874066" cy="230832"/>
+            </a:xfrm>
+            <a:prstGeom prst="rect">
+              <a:avLst/>
+            </a:prstGeom>
+            <a:solidFill>
+              <a:srgbClr val="F3F7F9"/>
+            </a:solidFill>
+          </p:spPr>
+          <p:txBody>
+            <a:bodyPr wrap="square">
+              <a:spAutoFit/>
+            </a:bodyPr>
+            <a:lstStyle/>
+            <a:p>
+              <a:r>
+                <a:rPr lang="en-US" sz="900" dirty="0"/>
+                <a:t>heat pumps</a:t>
+              </a:r>
+            </a:p>
+          </p:txBody>
+        </p:sp>
+        <p:sp>
+          <p:nvSpPr>
+            <p:cNvPr id="17" name="TextBox 16">
+              <a:extLst>
+                <a:ext uri="{FF2B5EF4-FFF2-40B4-BE49-F238E27FC236}">
+                  <a16:creationId xmlns:a16="http://schemas.microsoft.com/office/drawing/2014/main" id="{E7B4AA98-1935-9E22-17F2-A19C2B941FAF}"/>
+                </a:ext>
+              </a:extLst>
+            </p:cNvPr>
+            <p:cNvSpPr txBox="1"/>
+            <p:nvPr/>
+          </p:nvSpPr>
+          <p:spPr>
+            <a:xfrm>
+              <a:off x="427645" y="5443028"/>
+              <a:ext cx="849672" cy="200055"/>
+            </a:xfrm>
+            <a:prstGeom prst="rect">
+              <a:avLst/>
+            </a:prstGeom>
+            <a:solidFill>
+              <a:srgbClr val="F3F7F9"/>
+            </a:solidFill>
+          </p:spPr>
+          <p:txBody>
+            <a:bodyPr wrap="square">
+              <a:spAutoFit/>
+            </a:bodyPr>
+            <a:lstStyle/>
+            <a:p>
+              <a:r>
+                <a:rPr lang="en-US" sz="700" b="1" dirty="0"/>
+                <a:t>Resident</a:t>
+              </a:r>
+            </a:p>
+          </p:txBody>
+        </p:sp>
+        <p:grpSp>
+          <p:nvGrpSpPr>
+            <p:cNvPr id="8" name="Group 7">
+              <a:extLst>
+                <a:ext uri="{FF2B5EF4-FFF2-40B4-BE49-F238E27FC236}">
+                  <a16:creationId xmlns:a16="http://schemas.microsoft.com/office/drawing/2014/main" id="{77C064F3-660A-42B4-92A3-D55D826D5D82}"/>
+                </a:ext>
+              </a:extLst>
+            </p:cNvPr>
+            <p:cNvGrpSpPr/>
+            <p:nvPr/>
+          </p:nvGrpSpPr>
+          <p:grpSpPr>
+            <a:xfrm>
+              <a:off x="-38534" y="4684532"/>
+              <a:ext cx="693442" cy="915473"/>
+              <a:chOff x="-38534" y="4684532"/>
+              <a:chExt cx="693442" cy="915473"/>
+            </a:xfrm>
+          </p:grpSpPr>
+          <p:pic>
+            <p:nvPicPr>
+              <p:cNvPr id="7" name="Picture 6">
+                <a:extLst>
+                  <a:ext uri="{FF2B5EF4-FFF2-40B4-BE49-F238E27FC236}">
+                    <a16:creationId xmlns:a16="http://schemas.microsoft.com/office/drawing/2014/main" id="{3AF0FC34-E34B-4937-9FCB-5E630862F075}"/>
+                  </a:ext>
+                </a:extLst>
+              </p:cNvPr>
+              <p:cNvPicPr>
+                <a:picLocks noChangeAspect="1"/>
+              </p:cNvPicPr>
+              <p:nvPr/>
+            </p:nvPicPr>
+            <p:blipFill>
+              <a:blip r:embed="rId4"/>
+              <a:stretch>
+                <a:fillRect/>
+              </a:stretch>
+            </p:blipFill>
+            <p:spPr>
+              <a:xfrm>
+                <a:off x="69286" y="4684532"/>
+                <a:ext cx="485165" cy="632638"/>
+              </a:xfrm>
+              <a:prstGeom prst="rect">
+                <a:avLst/>
+              </a:prstGeom>
+            </p:spPr>
+          </p:pic>
+          <p:sp>
+            <p:nvSpPr>
+              <p:cNvPr id="5" name="TextBox 4">
+                <a:extLst>
+                  <a:ext uri="{FF2B5EF4-FFF2-40B4-BE49-F238E27FC236}">
+                    <a16:creationId xmlns:a16="http://schemas.microsoft.com/office/drawing/2014/main" id="{933DF100-729D-48EF-A4A3-2D45B21EC4ED}"/>
+                  </a:ext>
+                </a:extLst>
+              </p:cNvPr>
+              <p:cNvSpPr txBox="1"/>
+              <p:nvPr/>
+            </p:nvSpPr>
+            <p:spPr>
+              <a:xfrm>
+                <a:off x="-38534" y="5230673"/>
+                <a:ext cx="693442" cy="369332"/>
+              </a:xfrm>
+              <a:prstGeom prst="rect">
+                <a:avLst/>
+              </a:prstGeom>
+              <a:noFill/>
+            </p:spPr>
+            <p:txBody>
+              <a:bodyPr wrap="square" rtlCol="0">
+                <a:spAutoFit/>
+              </a:bodyPr>
+              <a:lstStyle/>
+              <a:p>
+                <a:pPr algn="ctr"/>
+                <a:r>
+                  <a:rPr lang="tr-TR" sz="900" dirty="0"/>
+                  <a:t>Charging Station</a:t>
+                </a:r>
+                <a:endParaRPr lang="de-AT" sz="900" dirty="0"/>
+              </a:p>
+            </p:txBody>
+          </p:sp>
+        </p:grpSp>
+        <p:sp>
+          <p:nvSpPr>
+            <p:cNvPr id="9" name="Oval 8">
+              <a:extLst>
+                <a:ext uri="{FF2B5EF4-FFF2-40B4-BE49-F238E27FC236}">
+                  <a16:creationId xmlns:a16="http://schemas.microsoft.com/office/drawing/2014/main" id="{F20E80D8-E75C-4C08-9578-997329013534}"/>
+                </a:ext>
+              </a:extLst>
+            </p:cNvPr>
+            <p:cNvSpPr/>
+            <p:nvPr/>
+          </p:nvSpPr>
+          <p:spPr>
+            <a:xfrm>
+              <a:off x="-274726" y="4321057"/>
+              <a:ext cx="1555469" cy="1556951"/>
+            </a:xfrm>
+            <a:prstGeom prst="ellipse">
+              <a:avLst/>
+            </a:prstGeom>
+            <a:noFill/>
+            <a:ln w="76200">
+              <a:solidFill>
+                <a:srgbClr val="C00000"/>
+              </a:solidFill>
+            </a:ln>
+          </p:spPr>
+          <p:style>
+            <a:lnRef idx="2">
+              <a:schemeClr val="accent1">
+                <a:shade val="50000"/>
+              </a:schemeClr>
+            </a:lnRef>
+            <a:fillRef idx="1">
+              <a:schemeClr val="accent1"/>
+            </a:fillRef>
+            <a:effectRef idx="0">
+              <a:schemeClr val="accent1"/>
+            </a:effectRef>
+            <a:fontRef idx="minor">
+              <a:schemeClr val="lt1"/>
+            </a:fontRef>
+          </p:style>
+          <p:txBody>
+            <a:bodyPr rtlCol="0" anchor="ctr"/>
+            <a:lstStyle/>
+            <a:p>
+              <a:pPr algn="ctr"/>
+              <a:endParaRPr lang="de-AT"/>
+            </a:p>
+          </p:txBody>
+        </p:sp>
+        <p:sp>
+          <p:nvSpPr>
+            <p:cNvPr id="18" name="TextBox 17">
+              <a:extLst>
+                <a:ext uri="{FF2B5EF4-FFF2-40B4-BE49-F238E27FC236}">
+                  <a16:creationId xmlns:a16="http://schemas.microsoft.com/office/drawing/2014/main" id="{AE0119AD-399A-6B8F-61CB-AB76BE6B4B36}"/>
+                </a:ext>
+              </a:extLst>
+            </p:cNvPr>
+            <p:cNvSpPr txBox="1"/>
+            <p:nvPr/>
+          </p:nvSpPr>
+          <p:spPr>
+            <a:xfrm>
+              <a:off x="51412" y="1665539"/>
+              <a:ext cx="1012340" cy="415498"/>
+            </a:xfrm>
+            <a:prstGeom prst="rect">
+              <a:avLst/>
+            </a:prstGeom>
+            <a:solidFill>
+              <a:srgbClr val="DEEBF2"/>
+            </a:solidFill>
+          </p:spPr>
+          <p:txBody>
+            <a:bodyPr wrap="square">
+              <a:spAutoFit/>
+            </a:bodyPr>
+            <a:lstStyle/>
+            <a:p>
+              <a:pPr algn="ctr"/>
+              <a:r>
+                <a:rPr lang="en-US" sz="700" b="1" dirty="0"/>
+                <a:t>Electric cars with adjustable charging stations</a:t>
+              </a:r>
+            </a:p>
+          </p:txBody>
+        </p:sp>
+        <p:sp>
+          <p:nvSpPr>
+            <p:cNvPr id="19" name="TextBox 18">
+              <a:extLst>
+                <a:ext uri="{FF2B5EF4-FFF2-40B4-BE49-F238E27FC236}">
+                  <a16:creationId xmlns:a16="http://schemas.microsoft.com/office/drawing/2014/main" id="{E406F1F0-8D49-3056-6126-830CD0687A3A}"/>
+                </a:ext>
+              </a:extLst>
+            </p:cNvPr>
+            <p:cNvSpPr txBox="1"/>
+            <p:nvPr/>
+          </p:nvSpPr>
+          <p:spPr>
+            <a:xfrm>
+              <a:off x="1026500" y="1638371"/>
+              <a:ext cx="1319022" cy="630942"/>
+            </a:xfrm>
+            <a:prstGeom prst="rect">
+              <a:avLst/>
+            </a:prstGeom>
+            <a:solidFill>
+              <a:srgbClr val="DEEBF2"/>
+            </a:solidFill>
+          </p:spPr>
+          <p:txBody>
+            <a:bodyPr wrap="square">
+              <a:spAutoFit/>
+            </a:bodyPr>
+            <a:lstStyle>
+              <a:defPPr>
+                <a:defRPr lang="en-US"/>
+              </a:defPPr>
+              <a:lvl1pPr algn="ctr">
+                <a:defRPr sz="700"/>
+              </a:lvl1pPr>
+            </a:lstStyle>
+            <a:p>
+              <a:r>
+                <a:rPr lang="en-US" b="1" dirty="0"/>
+                <a:t>Home Automation Interface - customer-adjustable interface control, e.g., of heat pumps</a:t>
+              </a:r>
+            </a:p>
+          </p:txBody>
+        </p:sp>
+        <p:sp>
+          <p:nvSpPr>
+            <p:cNvPr id="20" name="TextBox 19">
+              <a:extLst>
+                <a:ext uri="{FF2B5EF4-FFF2-40B4-BE49-F238E27FC236}">
+                  <a16:creationId xmlns:a16="http://schemas.microsoft.com/office/drawing/2014/main" id="{090EFB64-8E16-6B47-4DCD-A37D8F7E62A2}"/>
+                </a:ext>
+              </a:extLst>
+            </p:cNvPr>
+            <p:cNvSpPr txBox="1"/>
+            <p:nvPr/>
+          </p:nvSpPr>
+          <p:spPr>
+            <a:xfrm>
+              <a:off x="2250549" y="1662296"/>
+              <a:ext cx="1024128" cy="523220"/>
+            </a:xfrm>
+            <a:prstGeom prst="rect">
+              <a:avLst/>
+            </a:prstGeom>
+            <a:solidFill>
+              <a:srgbClr val="DEEBF2"/>
+            </a:solidFill>
+          </p:spPr>
+          <p:txBody>
+            <a:bodyPr wrap="square">
+              <a:spAutoFit/>
+            </a:bodyPr>
+            <a:lstStyle>
+              <a:defPPr>
+                <a:defRPr lang="en-US"/>
+              </a:defPPr>
+              <a:lvl1pPr algn="ctr">
+                <a:defRPr sz="700"/>
+              </a:lvl1pPr>
+            </a:lstStyle>
+            <a:p>
+              <a:r>
+                <a:rPr lang="en-US" b="1" dirty="0"/>
+                <a:t>Photovoltaic systems with adjustable inverters</a:t>
+              </a:r>
+            </a:p>
+          </p:txBody>
+        </p:sp>
+        <p:sp>
+          <p:nvSpPr>
+            <p:cNvPr id="21" name="TextBox 20">
+              <a:extLst>
+                <a:ext uri="{FF2B5EF4-FFF2-40B4-BE49-F238E27FC236}">
+                  <a16:creationId xmlns:a16="http://schemas.microsoft.com/office/drawing/2014/main" id="{E4507318-B609-48E0-DA86-0912CC689279}"/>
+                </a:ext>
+              </a:extLst>
+            </p:cNvPr>
+            <p:cNvSpPr txBox="1"/>
+            <p:nvPr/>
+          </p:nvSpPr>
+          <p:spPr>
+            <a:xfrm>
+              <a:off x="4425113" y="2084647"/>
+              <a:ext cx="1054931" cy="369332"/>
+            </a:xfrm>
+            <a:prstGeom prst="rect">
+              <a:avLst/>
+            </a:prstGeom>
+            <a:solidFill>
+              <a:srgbClr val="E0EBF3"/>
+            </a:solidFill>
+          </p:spPr>
+          <p:txBody>
+            <a:bodyPr wrap="square">
+              <a:spAutoFit/>
+            </a:bodyPr>
+            <a:lstStyle/>
+            <a:p>
+              <a:pPr algn="ctr"/>
+              <a:r>
+                <a:rPr lang="en-US" sz="900" dirty="0"/>
+                <a:t>Power substation</a:t>
+              </a:r>
+            </a:p>
+          </p:txBody>
+        </p:sp>
+        <p:sp>
+          <p:nvSpPr>
+            <p:cNvPr id="22" name="TextBox 21">
+              <a:extLst>
+                <a:ext uri="{FF2B5EF4-FFF2-40B4-BE49-F238E27FC236}">
+                  <a16:creationId xmlns:a16="http://schemas.microsoft.com/office/drawing/2014/main" id="{21FE5AC7-B52D-9752-2FD0-8D5B7F49D329}"/>
+                </a:ext>
+              </a:extLst>
+            </p:cNvPr>
+            <p:cNvSpPr txBox="1"/>
+            <p:nvPr/>
+          </p:nvSpPr>
+          <p:spPr>
+            <a:xfrm>
+              <a:off x="5431316" y="4730200"/>
+              <a:ext cx="830413" cy="415498"/>
+            </a:xfrm>
+            <a:prstGeom prst="rect">
+              <a:avLst/>
+            </a:prstGeom>
+            <a:solidFill>
+              <a:srgbClr val="EEF3FA"/>
+            </a:solidFill>
+          </p:spPr>
+          <p:txBody>
+            <a:bodyPr wrap="square">
+              <a:spAutoFit/>
+            </a:bodyPr>
+            <a:lstStyle/>
+            <a:p>
+              <a:pPr algn="ctr"/>
+              <a:r>
+                <a:rPr lang="en-US" sz="700" b="1" dirty="0"/>
+                <a:t>250 kV regulating transformer</a:t>
+              </a:r>
+            </a:p>
+          </p:txBody>
+        </p:sp>
+        <p:sp>
+          <p:nvSpPr>
+            <p:cNvPr id="23" name="TextBox 22">
+              <a:extLst>
+                <a:ext uri="{FF2B5EF4-FFF2-40B4-BE49-F238E27FC236}">
+                  <a16:creationId xmlns:a16="http://schemas.microsoft.com/office/drawing/2014/main" id="{25CDC850-D0A1-B07F-E02F-BD4EC7070911}"/>
+                </a:ext>
+              </a:extLst>
+            </p:cNvPr>
+            <p:cNvSpPr txBox="1"/>
+            <p:nvPr/>
+          </p:nvSpPr>
+          <p:spPr>
+            <a:xfrm>
+              <a:off x="4261101" y="5686792"/>
+              <a:ext cx="1170215" cy="307777"/>
+            </a:xfrm>
+            <a:prstGeom prst="rect">
+              <a:avLst/>
+            </a:prstGeom>
+            <a:solidFill>
+              <a:srgbClr val="EEF3FA"/>
+            </a:solidFill>
+          </p:spPr>
+          <p:txBody>
+            <a:bodyPr wrap="square">
+              <a:spAutoFit/>
+            </a:bodyPr>
+            <a:lstStyle/>
+            <a:p>
+              <a:pPr algn="ctr"/>
+              <a:r>
+                <a:rPr lang="en-US" sz="700" b="1" dirty="0">
+                  <a:solidFill>
+                    <a:srgbClr val="3E9124"/>
+                  </a:solidFill>
+                </a:rPr>
+                <a:t>Communication network</a:t>
+              </a:r>
+            </a:p>
+          </p:txBody>
+        </p:sp>
+        <p:sp>
+          <p:nvSpPr>
+            <p:cNvPr id="24" name="TextBox 23">
+              <a:extLst>
+                <a:ext uri="{FF2B5EF4-FFF2-40B4-BE49-F238E27FC236}">
+                  <a16:creationId xmlns:a16="http://schemas.microsoft.com/office/drawing/2014/main" id="{1F306F0D-7440-03C1-C02A-B3A9ED62904F}"/>
+                </a:ext>
+              </a:extLst>
+            </p:cNvPr>
+            <p:cNvSpPr txBox="1"/>
+            <p:nvPr/>
+          </p:nvSpPr>
+          <p:spPr>
+            <a:xfrm>
+              <a:off x="3684539" y="3416997"/>
+              <a:ext cx="805890" cy="415498"/>
+            </a:xfrm>
+            <a:prstGeom prst="rect">
+              <a:avLst/>
+            </a:prstGeom>
+            <a:solidFill>
+              <a:srgbClr val="EEF3FA"/>
+            </a:solidFill>
+          </p:spPr>
+          <p:txBody>
+            <a:bodyPr wrap="square">
+              <a:spAutoFit/>
+            </a:bodyPr>
+            <a:lstStyle/>
+            <a:p>
+              <a:pPr algn="ctr"/>
+              <a:r>
+                <a:rPr lang="en-US" sz="700" b="1" dirty="0"/>
+                <a:t>Intelligent voltage regulator</a:t>
+              </a:r>
+            </a:p>
+          </p:txBody>
+        </p:sp>
+      </p:grpSp>
+    </p:spTree>
+    <p:extLst>
+      <p:ext uri="{BB962C8B-B14F-4D97-AF65-F5344CB8AC3E}">
+        <p14:creationId xmlns:p14="http://schemas.microsoft.com/office/powerpoint/2010/main" val="3535724427"/>
+      </p:ext>
+    </p:extLst>
+  </p:cSld>
+  <p:clrMapOvr>
+    <a:masterClrMapping/>
+  </p:clrMapOvr>
+</p:sld>
+</file>
+
 <file path=ppt/slides/slide2.xml><?xml version="1.0" encoding="utf-8"?>
 <p:sld xmlns:a="http://schemas.openxmlformats.org/drawingml/2006/main" xmlns:r="http://schemas.openxmlformats.org/officeDocument/2006/relationships" xmlns:p="http://schemas.openxmlformats.org/presentationml/2006/main">
   <p:cSld>
@@ -15971,65 +16771,52 @@
         </p:nvSpPr>
         <p:spPr>
           <a:xfrm>
-            <a:off x="1024128" y="0"/>
-            <a:ext cx="9720072" cy="890337"/>
+            <a:off x="0" y="0"/>
+            <a:ext cx="6858000" cy="2149642"/>
           </a:xfrm>
         </p:spPr>
         <p:txBody>
-          <a:bodyPr/>
+          <a:bodyPr>
+            <a:normAutofit fontScale="90000"/>
+          </a:bodyPr>
           <a:lstStyle/>
           <a:p>
             <a:r>
               <a:rPr lang="de-AT" dirty="0"/>
-              <a:t>FORDCS</a:t>
+              <a:t>FORD Charging Station</a:t>
             </a:r>
             <a:r>
               <a:rPr lang="tr-TR" dirty="0"/>
               <a:t> </a:t>
             </a:r>
+            <a:br>
+              <a:rPr lang="de-AT" dirty="0"/>
+            </a:br>
             <a:r>
               <a:rPr lang="de-AT" dirty="0"/>
               <a:t>C</a:t>
             </a:r>
             <a:r>
               <a:rPr lang="tr-TR" dirty="0"/>
-              <a:t>ONTEXT – SMART HOME</a:t>
+              <a:t>ONTEXT </a:t>
+            </a:r>
+            <a:br>
+              <a:rPr lang="de-AT" dirty="0"/>
+            </a:br>
+            <a:r>
+              <a:rPr lang="tr-TR" dirty="0"/>
+              <a:t>SMART HOME</a:t>
             </a:r>
             <a:endParaRPr lang="de-AT" dirty="0"/>
-          </a:p>
-        </p:txBody>
-      </p:sp>
-      <p:sp>
-        <p:nvSpPr>
-          <p:cNvPr id="3" name="Content Placeholder 2">
-            <a:extLst>
-              <a:ext uri="{FF2B5EF4-FFF2-40B4-BE49-F238E27FC236}">
-                <a16:creationId xmlns:a16="http://schemas.microsoft.com/office/drawing/2014/main" id="{3E6BF13F-FA46-4F06-BEFB-5B0CA69F1086}"/>
-              </a:ext>
-            </a:extLst>
-          </p:cNvPr>
-          <p:cNvSpPr>
-            <a:spLocks noGrp="1"/>
-          </p:cNvSpPr>
-          <p:nvPr>
-            <p:ph idx="1"/>
-          </p:nvPr>
-        </p:nvSpPr>
-        <p:spPr/>
-        <p:txBody>
-          <a:bodyPr/>
-          <a:lstStyle/>
-          <a:p>
-            <a:endParaRPr lang="de-AT"/>
           </a:p>
         </p:txBody>
       </p:sp>
       <p:pic>
         <p:nvPicPr>
-          <p:cNvPr id="4" name="Picture 3">
+          <p:cNvPr id="28" name="Picture 27">
             <a:extLst>
               <a:ext uri="{FF2B5EF4-FFF2-40B4-BE49-F238E27FC236}">
-                <a16:creationId xmlns:a16="http://schemas.microsoft.com/office/drawing/2014/main" id="{7680AEE7-12BC-483B-9DB1-5B494A08A5A2}"/>
+                <a16:creationId xmlns:a16="http://schemas.microsoft.com/office/drawing/2014/main" id="{16699D8E-8987-AB1D-AE02-CA84320BD962}"/>
               </a:ext>
             </a:extLst>
           </p:cNvPr>
@@ -16046,184 +16833,14 @@
         </p:blipFill>
         <p:spPr>
           <a:xfrm>
-            <a:off x="6328611" y="1479884"/>
-            <a:ext cx="5860518" cy="4451684"/>
+            <a:off x="5053264" y="408246"/>
+            <a:ext cx="7049348" cy="6330820"/>
           </a:xfrm>
           <a:prstGeom prst="rect">
             <a:avLst/>
           </a:prstGeom>
         </p:spPr>
       </p:pic>
-      <p:pic>
-        <p:nvPicPr>
-          <p:cNvPr id="6" name="Picture 5">
-            <a:extLst>
-              <a:ext uri="{FF2B5EF4-FFF2-40B4-BE49-F238E27FC236}">
-                <a16:creationId xmlns:a16="http://schemas.microsoft.com/office/drawing/2014/main" id="{31156CC1-9551-475E-98BA-17485BDC4B68}"/>
-              </a:ext>
-            </a:extLst>
-          </p:cNvPr>
-          <p:cNvPicPr>
-            <a:picLocks noChangeAspect="1"/>
-          </p:cNvPicPr>
-          <p:nvPr/>
-        </p:nvPicPr>
-        <p:blipFill>
-          <a:blip r:embed="rId3"/>
-          <a:stretch>
-            <a:fillRect/>
-          </a:stretch>
-        </p:blipFill>
-        <p:spPr>
-          <a:xfrm>
-            <a:off x="0" y="890337"/>
-            <a:ext cx="6328611" cy="5961326"/>
-          </a:xfrm>
-          <a:prstGeom prst="rect">
-            <a:avLst/>
-          </a:prstGeom>
-        </p:spPr>
-      </p:pic>
-      <p:grpSp>
-        <p:nvGrpSpPr>
-          <p:cNvPr id="8" name="Group 7">
-            <a:extLst>
-              <a:ext uri="{FF2B5EF4-FFF2-40B4-BE49-F238E27FC236}">
-                <a16:creationId xmlns:a16="http://schemas.microsoft.com/office/drawing/2014/main" id="{77C064F3-660A-42B4-92A3-D55D826D5D82}"/>
-              </a:ext>
-            </a:extLst>
-          </p:cNvPr>
-          <p:cNvGrpSpPr/>
-          <p:nvPr/>
-        </p:nvGrpSpPr>
-        <p:grpSpPr>
-          <a:xfrm>
-            <a:off x="-38534" y="4684532"/>
-            <a:ext cx="693442" cy="915473"/>
-            <a:chOff x="-38534" y="4684532"/>
-            <a:chExt cx="693442" cy="915473"/>
-          </a:xfrm>
-        </p:grpSpPr>
-        <p:pic>
-          <p:nvPicPr>
-            <p:cNvPr id="7" name="Picture 6">
-              <a:extLst>
-                <a:ext uri="{FF2B5EF4-FFF2-40B4-BE49-F238E27FC236}">
-                  <a16:creationId xmlns:a16="http://schemas.microsoft.com/office/drawing/2014/main" id="{3AF0FC34-E34B-4937-9FCB-5E630862F075}"/>
-                </a:ext>
-              </a:extLst>
-            </p:cNvPr>
-            <p:cNvPicPr>
-              <a:picLocks noChangeAspect="1"/>
-            </p:cNvPicPr>
-            <p:nvPr/>
-          </p:nvPicPr>
-          <p:blipFill>
-            <a:blip r:embed="rId4"/>
-            <a:stretch>
-              <a:fillRect/>
-            </a:stretch>
-          </p:blipFill>
-          <p:spPr>
-            <a:xfrm>
-              <a:off x="69286" y="4684532"/>
-              <a:ext cx="485165" cy="632638"/>
-            </a:xfrm>
-            <a:prstGeom prst="rect">
-              <a:avLst/>
-            </a:prstGeom>
-          </p:spPr>
-        </p:pic>
-        <p:sp>
-          <p:nvSpPr>
-            <p:cNvPr id="5" name="TextBox 4">
-              <a:extLst>
-                <a:ext uri="{FF2B5EF4-FFF2-40B4-BE49-F238E27FC236}">
-                  <a16:creationId xmlns:a16="http://schemas.microsoft.com/office/drawing/2014/main" id="{933DF100-729D-48EF-A4A3-2D45B21EC4ED}"/>
-                </a:ext>
-              </a:extLst>
-            </p:cNvPr>
-            <p:cNvSpPr txBox="1"/>
-            <p:nvPr/>
-          </p:nvSpPr>
-          <p:spPr>
-            <a:xfrm>
-              <a:off x="-38534" y="5230673"/>
-              <a:ext cx="693442" cy="369332"/>
-            </a:xfrm>
-            <a:prstGeom prst="rect">
-              <a:avLst/>
-            </a:prstGeom>
-            <a:noFill/>
-          </p:spPr>
-          <p:txBody>
-            <a:bodyPr wrap="square" rtlCol="0">
-              <a:spAutoFit/>
-            </a:bodyPr>
-            <a:lstStyle/>
-            <a:p>
-              <a:pPr algn="ctr"/>
-              <a:r>
-                <a:rPr lang="tr-TR" sz="900" dirty="0"/>
-                <a:t>Charging Station</a:t>
-              </a:r>
-              <a:endParaRPr lang="de-AT" sz="900" dirty="0"/>
-            </a:p>
-          </p:txBody>
-        </p:sp>
-      </p:grpSp>
-      <p:sp>
-        <p:nvSpPr>
-          <p:cNvPr id="9" name="Oval 8">
-            <a:extLst>
-              <a:ext uri="{FF2B5EF4-FFF2-40B4-BE49-F238E27FC236}">
-                <a16:creationId xmlns:a16="http://schemas.microsoft.com/office/drawing/2014/main" id="{F20E80D8-E75C-4C08-9578-997329013534}"/>
-              </a:ext>
-            </a:extLst>
-          </p:cNvPr>
-          <p:cNvSpPr/>
-          <p:nvPr/>
-        </p:nvSpPr>
-        <p:spPr>
-          <a:xfrm>
-            <a:off x="-531341" y="4176584"/>
-            <a:ext cx="1555469" cy="1556951"/>
-          </a:xfrm>
-          <a:prstGeom prst="ellipse">
-            <a:avLst/>
-          </a:prstGeom>
-          <a:noFill/>
-          <a:ln w="76200">
-            <a:solidFill>
-              <a:srgbClr val="C00000"/>
-            </a:solidFill>
-          </a:ln>
-        </p:spPr>
-        <p:style>
-          <a:lnRef idx="2">
-            <a:schemeClr val="accent1">
-              <a:shade val="50000"/>
-            </a:schemeClr>
-          </a:lnRef>
-          <a:fillRef idx="1">
-            <a:schemeClr val="accent1"/>
-          </a:fillRef>
-          <a:effectRef idx="0">
-            <a:schemeClr val="accent1"/>
-          </a:effectRef>
-          <a:fontRef idx="minor">
-            <a:schemeClr val="lt1"/>
-          </a:fontRef>
-        </p:style>
-        <p:txBody>
-          <a:bodyPr rtlCol="0" anchor="ctr"/>
-          <a:lstStyle/>
-          <a:p>
-            <a:pPr algn="ctr"/>
-            <a:endParaRPr lang="de-AT"/>
-          </a:p>
-        </p:txBody>
-      </p:sp>
     </p:spTree>
     <p:extLst>
       <p:ext uri="{BB962C8B-B14F-4D97-AF65-F5344CB8AC3E}">

</xml_diff>